<commit_message>
add "Hello World" and finish D2 installation
</commit_message>
<xml_diff>
--- a/d2_tutorial.pptx
+++ b/d2_tutorial.pptx
@@ -4269,11 +4269,13 @@
         </p:nvSpPr>
         <p:spPr/>
         <p:txBody>
-          <a:bodyPr/>
+          <a:bodyPr>
+            <a:normAutofit/>
+          </a:bodyPr>
           <a:lstStyle/>
           <a:p>
             <a:r>
-              <a:rPr lang="en-US" dirty="0"/>
+              <a:rPr lang="en-US" sz="4800" dirty="0"/>
               <a:t>D2 Introduction</a:t>
             </a:r>
           </a:p>
@@ -4789,10 +4791,10 @@
       </p:grpSpPr>
       <p:pic>
         <p:nvPicPr>
-          <p:cNvPr id="3" name="Picture 2">
+          <p:cNvPr id="12" name="Picture 11">
             <a:extLst>
               <a:ext uri="{FF2B5EF4-FFF2-40B4-BE49-F238E27FC236}">
-                <a16:creationId xmlns:a16="http://schemas.microsoft.com/office/drawing/2014/main" id="{1CEAFE43-52AC-F762-C45F-7EBF850B787E}"/>
+                <a16:creationId xmlns:a16="http://schemas.microsoft.com/office/drawing/2014/main" id="{C15F91F7-D5CF-43A6-CB95-C4F696BDC043}"/>
               </a:ext>
             </a:extLst>
           </p:cNvPr>
@@ -4809,22 +4811,12 @@
         </p:blipFill>
         <p:spPr>
           <a:xfrm>
-            <a:off x="8075612" y="1955942"/>
-            <a:ext cx="2286000" cy="2260315"/>
+            <a:off x="455612" y="0"/>
+            <a:ext cx="10384837" cy="6858000"/>
           </a:xfrm>
           <a:prstGeom prst="rect">
             <a:avLst/>
           </a:prstGeom>
-          <a:ln>
-            <a:noFill/>
-          </a:ln>
-          <a:effectLst>
-            <a:outerShdw blurRad="292100" dist="139700" dir="2700000" algn="tl" rotWithShape="0">
-              <a:srgbClr val="333333">
-                <a:alpha val="65000"/>
-              </a:srgbClr>
-            </a:outerShdw>
-          </a:effectLst>
         </p:spPr>
       </p:pic>
       <p:pic>
@@ -4848,13 +4840,17 @@
           </a:stretch>
         </p:blipFill>
         <p:spPr>
-          <a:xfrm>
-            <a:off x="5027612" y="418590"/>
-            <a:ext cx="2805280" cy="6020819"/>
+          <a:xfrm rot="21254893">
+            <a:off x="4872836" y="1426803"/>
+            <a:ext cx="4192810" cy="4004392"/>
           </a:xfrm>
           <a:prstGeom prst="rect">
             <a:avLst/>
           </a:prstGeom>
+          <a:scene3d>
+            <a:camera prst="isometricOffAxis2Left"/>
+            <a:lightRig rig="threePt" dir="t"/>
+          </a:scene3d>
         </p:spPr>
       </p:pic>
       <p:pic>
@@ -4886,8 +4882,8 @@
         </p:blipFill>
         <p:spPr bwMode="auto">
           <a:xfrm>
-            <a:off x="-77788" y="838200"/>
-            <a:ext cx="5245100" cy="4495800"/>
+            <a:off x="303212" y="1295400"/>
+            <a:ext cx="4445000" cy="3810000"/>
           </a:xfrm>
           <a:prstGeom prst="rect">
             <a:avLst/>
@@ -4902,6 +4898,46 @@
               </a14:hiddenFill>
             </a:ext>
           </a:extLst>
+        </p:spPr>
+      </p:pic>
+      <p:pic>
+        <p:nvPicPr>
+          <p:cNvPr id="3" name="Picture 2">
+            <a:extLst>
+              <a:ext uri="{FF2B5EF4-FFF2-40B4-BE49-F238E27FC236}">
+                <a16:creationId xmlns:a16="http://schemas.microsoft.com/office/drawing/2014/main" id="{1CEAFE43-52AC-F762-C45F-7EBF850B787E}"/>
+              </a:ext>
+            </a:extLst>
+          </p:cNvPr>
+          <p:cNvPicPr>
+            <a:picLocks noChangeAspect="1"/>
+          </p:cNvPicPr>
+          <p:nvPr/>
+        </p:nvPicPr>
+        <p:blipFill>
+          <a:blip r:embed="rId5"/>
+          <a:stretch>
+            <a:fillRect/>
+          </a:stretch>
+        </p:blipFill>
+        <p:spPr>
+          <a:xfrm>
+            <a:off x="7542212" y="2438400"/>
+            <a:ext cx="2286000" cy="2260315"/>
+          </a:xfrm>
+          <a:prstGeom prst="rect">
+            <a:avLst/>
+          </a:prstGeom>
+          <a:ln>
+            <a:noFill/>
+          </a:ln>
+          <a:effectLst>
+            <a:outerShdw blurRad="292100" dist="139700" dir="2700000" algn="tl" rotWithShape="0">
+              <a:srgbClr val="333333">
+                <a:alpha val="65000"/>
+              </a:srgbClr>
+            </a:outerShdw>
+          </a:effectLst>
         </p:spPr>
       </p:pic>
     </p:spTree>

</xml_diff>